<commit_message>
added logo,'add' button, fixed routes
</commit_message>
<xml_diff>
--- a/README EquityWatchlist.pptx
+++ b/README EquityWatchlist.pptx
@@ -5,20 +5,22 @@
     <p:sldMasterId id="2147484474" r:id="rId1"/>
   </p:sldMasterIdLst>
   <p:notesMasterIdLst>
-    <p:notesMasterId r:id="rId10"/>
+    <p:notesMasterId r:id="rId12"/>
   </p:notesMasterIdLst>
   <p:handoutMasterIdLst>
-    <p:handoutMasterId r:id="rId11"/>
+    <p:handoutMasterId r:id="rId13"/>
   </p:handoutMasterIdLst>
   <p:sldIdLst>
     <p:sldId id="268" r:id="rId2"/>
     <p:sldId id="269" r:id="rId3"/>
     <p:sldId id="272" r:id="rId4"/>
-    <p:sldId id="280" r:id="rId5"/>
-    <p:sldId id="285" r:id="rId6"/>
-    <p:sldId id="273" r:id="rId7"/>
-    <p:sldId id="286" r:id="rId8"/>
-    <p:sldId id="278" r:id="rId9"/>
+    <p:sldId id="287" r:id="rId5"/>
+    <p:sldId id="288" r:id="rId6"/>
+    <p:sldId id="285" r:id="rId7"/>
+    <p:sldId id="273" r:id="rId8"/>
+    <p:sldId id="286" r:id="rId9"/>
+    <p:sldId id="280" r:id="rId10"/>
+    <p:sldId id="278" r:id="rId11"/>
   </p:sldIdLst>
   <p:sldSz cx="12188825" cy="6858000"/>
   <p:notesSz cx="6858000" cy="9144000"/>
@@ -247,7 +249,7 @@
           <a:p>
             <a:fld id="{BEA74EB7-856E-45FD-83F0-5F7C6F3E4372}" type="datetimeFigureOut">
               <a:rPr lang="en-US"/>
-              <a:t>8/11/2019</a:t>
+              <a:t>8/13/2019</a:t>
             </a:fld>
             <a:endParaRPr dirty="0"/>
           </a:p>
@@ -412,7 +414,7 @@
           <a:p>
             <a:fld id="{C61B0E40-8125-41F8-BB6C-139D8D531A4F}" type="datetimeFigureOut">
               <a:rPr lang="en-US"/>
-              <a:t>8/11/2019</a:t>
+              <a:t>8/13/2019</a:t>
             </a:fld>
             <a:endParaRPr dirty="0"/>
           </a:p>
@@ -970,7 +972,7 @@
           <a:bodyPr/>
           <a:lstStyle/>
           <a:p>
-            <a:endParaRPr lang="en-US"/>
+            <a:endParaRPr lang="en-US" dirty="0"/>
           </a:p>
         </p:txBody>
       </p:sp>
@@ -991,7 +993,7 @@
           <a:p>
             <a:fld id="{BF105DB2-FD3E-441D-8B7E-7AE83ECE27B3}" type="slidenum">
               <a:rPr lang="en-US" smtClean="0"/>
-              <a:t>4</a:t>
+              <a:t>6</a:t>
             </a:fld>
             <a:endParaRPr lang="en-US" dirty="0"/>
           </a:p>
@@ -1000,7 +1002,7 @@
     </p:spTree>
     <p:extLst>
       <p:ext uri="{BB962C8B-B14F-4D97-AF65-F5344CB8AC3E}">
-        <p14:creationId xmlns:p14="http://schemas.microsoft.com/office/powerpoint/2010/main" val="2445734644"/>
+        <p14:creationId xmlns:p14="http://schemas.microsoft.com/office/powerpoint/2010/main" val="170760516"/>
       </p:ext>
     </p:extLst>
   </p:cSld>
@@ -1054,7 +1056,7 @@
           <a:bodyPr/>
           <a:lstStyle/>
           <a:p>
-            <a:endParaRPr lang="en-US" dirty="0"/>
+            <a:endParaRPr lang="en-US"/>
           </a:p>
         </p:txBody>
       </p:sp>
@@ -1075,7 +1077,7 @@
           <a:p>
             <a:fld id="{BF105DB2-FD3E-441D-8B7E-7AE83ECE27B3}" type="slidenum">
               <a:rPr lang="en-US" smtClean="0"/>
-              <a:t>5</a:t>
+              <a:t>7</a:t>
             </a:fld>
             <a:endParaRPr lang="en-US" dirty="0"/>
           </a:p>
@@ -1084,7 +1086,7 @@
     </p:spTree>
     <p:extLst>
       <p:ext uri="{BB962C8B-B14F-4D97-AF65-F5344CB8AC3E}">
-        <p14:creationId xmlns:p14="http://schemas.microsoft.com/office/powerpoint/2010/main" val="170760516"/>
+        <p14:creationId xmlns:p14="http://schemas.microsoft.com/office/powerpoint/2010/main" val="1400489487"/>
       </p:ext>
     </p:extLst>
   </p:cSld>
@@ -1159,7 +1161,7 @@
           <a:p>
             <a:fld id="{BF105DB2-FD3E-441D-8B7E-7AE83ECE27B3}" type="slidenum">
               <a:rPr lang="en-US" smtClean="0"/>
-              <a:t>6</a:t>
+              <a:t>9</a:t>
             </a:fld>
             <a:endParaRPr lang="en-US" dirty="0"/>
           </a:p>
@@ -1168,7 +1170,7 @@
     </p:spTree>
     <p:extLst>
       <p:ext uri="{BB962C8B-B14F-4D97-AF65-F5344CB8AC3E}">
-        <p14:creationId xmlns:p14="http://schemas.microsoft.com/office/powerpoint/2010/main" val="1400489487"/>
+        <p14:creationId xmlns:p14="http://schemas.microsoft.com/office/powerpoint/2010/main" val="2445734644"/>
       </p:ext>
     </p:extLst>
   </p:cSld>
@@ -1243,7 +1245,7 @@
           <a:p>
             <a:fld id="{BF105DB2-FD3E-441D-8B7E-7AE83ECE27B3}" type="slidenum">
               <a:rPr lang="en-US" smtClean="0"/>
-              <a:t>8</a:t>
+              <a:t>10</a:t>
             </a:fld>
             <a:endParaRPr lang="en-US" dirty="0"/>
           </a:p>
@@ -1507,7 +1509,7 @@
           <a:p>
             <a:fld id="{333B76B7-5811-4114-8A95-998148FFD529}" type="datetime1">
               <a:rPr lang="en-US" smtClean="0"/>
-              <a:t>8/11/2019</a:t>
+              <a:t>8/13/2019</a:t>
             </a:fld>
             <a:endParaRPr lang="en-US" dirty="0"/>
           </a:p>
@@ -1793,7 +1795,7 @@
           <a:p>
             <a:fld id="{175C077A-EF7A-41AA-8976-110EB7416C60}" type="datetime1">
               <a:rPr lang="en-US" smtClean="0"/>
-              <a:t>8/11/2019</a:t>
+              <a:t>8/13/2019</a:t>
             </a:fld>
             <a:endParaRPr lang="en-US" dirty="0"/>
           </a:p>
@@ -2052,7 +2054,7 @@
           <a:p>
             <a:fld id="{CFF5912B-6681-4BDF-AE10-F59636249FF3}" type="datetime1">
               <a:rPr lang="en-US" smtClean="0"/>
-              <a:t>8/11/2019</a:t>
+              <a:t>8/13/2019</a:t>
             </a:fld>
             <a:endParaRPr lang="en-US" dirty="0"/>
           </a:p>
@@ -2295,7 +2297,7 @@
           <a:p>
             <a:fld id="{905C8E22-D0BA-4CB4-9C32-B27533199514}" type="datetime1">
               <a:rPr lang="en-US" smtClean="0"/>
-              <a:t>8/11/2019</a:t>
+              <a:t>8/13/2019</a:t>
             </a:fld>
             <a:endParaRPr dirty="0"/>
           </a:p>
@@ -2508,7 +2510,7 @@
           <a:p>
             <a:fld id="{FC2180A9-7A83-412D-A8AC-5AF60A8AA507}" type="datetime1">
               <a:rPr lang="en-US" smtClean="0"/>
-              <a:t>8/11/2019</a:t>
+              <a:t>8/13/2019</a:t>
             </a:fld>
             <a:endParaRPr lang="en-US" dirty="0"/>
           </a:p>
@@ -2839,7 +2841,7 @@
           <a:p>
             <a:fld id="{6A563DF0-FDDF-4143-9D8C-6AF41892E174}" type="datetime1">
               <a:rPr lang="en-US" smtClean="0"/>
-              <a:t>8/11/2019</a:t>
+              <a:t>8/13/2019</a:t>
             </a:fld>
             <a:endParaRPr lang="en-US" dirty="0"/>
           </a:p>
@@ -3165,7 +3167,7 @@
           <a:p>
             <a:fld id="{38BB83F9-4677-4C31-8407-7919061A580B}" type="datetime1">
               <a:rPr lang="en-US" smtClean="0"/>
-              <a:t>8/11/2019</a:t>
+              <a:t>8/13/2019</a:t>
             </a:fld>
             <a:endParaRPr lang="en-US" dirty="0"/>
           </a:p>
@@ -3616,7 +3618,7 @@
           <a:p>
             <a:fld id="{C33939A6-3450-434F-A872-BEE63F7EB093}" type="datetime1">
               <a:rPr lang="en-US" smtClean="0"/>
-              <a:t>8/11/2019</a:t>
+              <a:t>8/13/2019</a:t>
             </a:fld>
             <a:endParaRPr lang="en-US" dirty="0"/>
           </a:p>
@@ -3807,7 +3809,7 @@
           <a:p>
             <a:fld id="{E3BABB1C-FA00-4171-BA31-4C5E719472F3}" type="datetime1">
               <a:rPr lang="en-US" smtClean="0"/>
-              <a:t>8/11/2019</a:t>
+              <a:t>8/13/2019</a:t>
             </a:fld>
             <a:endParaRPr lang="en-US" dirty="0"/>
           </a:p>
@@ -3926,7 +3928,7 @@
           <a:p>
             <a:fld id="{D76C8610-5B57-4C6B-BF9F-F5397A1F60B8}" type="datetime1">
               <a:rPr lang="en-US" smtClean="0"/>
-              <a:t>8/11/2019</a:t>
+              <a:t>8/13/2019</a:t>
             </a:fld>
             <a:endParaRPr lang="en-US" dirty="0"/>
           </a:p>
@@ -4478,7 +4480,7 @@
           <a:p>
             <a:fld id="{BADBF3DD-8B6D-46AA-BCA9-242D4EF63DDF}" type="datetime1">
               <a:rPr lang="en-US" smtClean="0"/>
-              <a:t>8/11/2019</a:t>
+              <a:t>8/13/2019</a:t>
             </a:fld>
             <a:endParaRPr lang="en-US" dirty="0"/>
           </a:p>
@@ -4796,7 +4798,7 @@
           <a:p>
             <a:fld id="{23C41AE9-3D4A-4A08-B03D-DC6D2ADF5464}" type="datetime1">
               <a:rPr lang="en-US" smtClean="0"/>
-              <a:t>8/11/2019</a:t>
+              <a:t>8/13/2019</a:t>
             </a:fld>
             <a:endParaRPr lang="en-US" dirty="0"/>
           </a:p>
@@ -5028,7 +5030,7 @@
             <a:fld id="{5C6E67D0-0200-42BE-A0B2-78C70FBBB312}" type="datetime1">
               <a:rPr lang="en-US" smtClean="0"/>
               <a:pPr/>
-              <a:t>8/11/2019</a:t>
+              <a:t>8/13/2019</a:t>
             </a:fld>
             <a:endParaRPr lang="en-US" dirty="0"/>
           </a:p>
@@ -5754,6 +5756,135 @@
 </p:sld>
 </file>
 
+<file path=ppt/slides/slide10.xml><?xml version="1.0" encoding="utf-8"?>
+<p:sld xmlns:a="http://schemas.openxmlformats.org/drawingml/2006/main" xmlns:r="http://schemas.openxmlformats.org/officeDocument/2006/relationships" xmlns:p="http://schemas.openxmlformats.org/presentationml/2006/main">
+  <p:cSld>
+    <p:spTree>
+      <p:nvGrpSpPr>
+        <p:cNvPr id="1" name=""/>
+        <p:cNvGrpSpPr/>
+        <p:nvPr/>
+      </p:nvGrpSpPr>
+      <p:grpSpPr>
+        <a:xfrm>
+          <a:off x="0" y="0"/>
+          <a:ext cx="0" cy="0"/>
+          <a:chOff x="0" y="0"/>
+          <a:chExt cx="0" cy="0"/>
+        </a:xfrm>
+      </p:grpSpPr>
+      <p:sp>
+        <p:nvSpPr>
+          <p:cNvPr id="3" name="Title 2"/>
+          <p:cNvSpPr>
+            <a:spLocks noGrp="1"/>
+          </p:cNvSpPr>
+          <p:nvPr>
+            <p:ph type="title"/>
+          </p:nvPr>
+        </p:nvSpPr>
+        <p:spPr/>
+        <p:txBody>
+          <a:bodyPr/>
+          <a:lstStyle/>
+          <a:p>
+            <a:r>
+              <a:rPr lang="en-US" dirty="0"/>
+              <a:t>Extended </a:t>
+            </a:r>
+            <a:r>
+              <a:rPr lang="en-US" dirty="0" smtClean="0"/>
+              <a:t>Features</a:t>
+            </a:r>
+            <a:endParaRPr lang="en-US" dirty="0"/>
+          </a:p>
+        </p:txBody>
+      </p:sp>
+      <p:sp>
+        <p:nvSpPr>
+          <p:cNvPr id="2" name="Content Placeholder 1"/>
+          <p:cNvSpPr>
+            <a:spLocks noGrp="1"/>
+          </p:cNvSpPr>
+          <p:nvPr>
+            <p:ph idx="1"/>
+          </p:nvPr>
+        </p:nvSpPr>
+        <p:spPr/>
+        <p:txBody>
+          <a:bodyPr>
+            <a:normAutofit/>
+          </a:bodyPr>
+          <a:lstStyle/>
+          <a:p>
+            <a:pPr>
+              <a:buFont typeface="Wingdings" panose="05000000000000000000" pitchFamily="2" charset="2"/>
+              <a:buChar char="q"/>
+            </a:pPr>
+            <a:r>
+              <a:rPr lang="en-US" sz="2400" dirty="0" smtClean="0"/>
+              <a:t>Screening modules:</a:t>
+            </a:r>
+            <a:endParaRPr lang="en-US" sz="2400" dirty="0"/>
+          </a:p>
+          <a:p>
+            <a:pPr lvl="1"/>
+            <a:r>
+              <a:rPr lang="en-US" sz="2400" dirty="0"/>
+              <a:t>This will allow the user to </a:t>
+            </a:r>
+            <a:r>
+              <a:rPr lang="en-US" sz="2400" dirty="0" smtClean="0"/>
+              <a:t>select stocks by criteria</a:t>
+            </a:r>
+            <a:endParaRPr lang="en-US" sz="2400" dirty="0"/>
+          </a:p>
+          <a:p>
+            <a:pPr marL="320040" lvl="1" indent="0">
+              <a:buNone/>
+            </a:pPr>
+            <a:endParaRPr lang="en-US" sz="2400" dirty="0"/>
+          </a:p>
+          <a:p>
+            <a:pPr marL="0" indent="0">
+              <a:buNone/>
+            </a:pPr>
+            <a:endParaRPr lang="en-US" sz="2400" dirty="0"/>
+          </a:p>
+        </p:txBody>
+      </p:sp>
+    </p:spTree>
+    <p:extLst>
+      <p:ext uri="{BB962C8B-B14F-4D97-AF65-F5344CB8AC3E}">
+        <p14:creationId xmlns:p14="http://schemas.microsoft.com/office/powerpoint/2010/main" val="897847061"/>
+      </p:ext>
+    </p:extLst>
+  </p:cSld>
+  <p:clrMapOvr>
+    <a:masterClrMapping/>
+  </p:clrMapOvr>
+  <mc:AlternateContent xmlns:mc="http://schemas.openxmlformats.org/markup-compatibility/2006" xmlns:p14="http://schemas.microsoft.com/office/powerpoint/2010/main">
+    <mc:Choice Requires="p14">
+      <p:transition spd="med" p14:dur="700">
+        <p:fade/>
+      </p:transition>
+    </mc:Choice>
+    <mc:Fallback xmlns="">
+      <p:transition spd="med">
+        <p:fade/>
+      </p:transition>
+    </mc:Fallback>
+  </mc:AlternateContent>
+  <p:timing>
+    <p:tnLst>
+      <p:par>
+        <p:cTn id="1" dur="indefinite" restart="never" nodeType="tmRoot"/>
+      </p:par>
+    </p:tnLst>
+  </p:timing>
+</p:sld>
+</file>
+
 <file path=ppt/slides/slide2.xml><?xml version="1.0" encoding="utf-8"?>
 <p:sld xmlns:a="http://schemas.openxmlformats.org/drawingml/2006/main" xmlns:r="http://schemas.openxmlformats.org/officeDocument/2006/relationships" xmlns:p="http://schemas.openxmlformats.org/presentationml/2006/main">
   <p:cSld>
@@ -5788,7 +5919,11 @@
           <a:p>
             <a:r>
               <a:rPr lang="en-US" dirty="0" smtClean="0"/>
-              <a:t>Student </a:t>
+              <a:t>PROJECT</a:t>
+            </a:r>
+            <a:r>
+              <a:rPr lang="en-US" dirty="0" smtClean="0"/>
+              <a:t> </a:t>
             </a:r>
             <a:r>
               <a:rPr lang="en-US" dirty="0"/>
@@ -5809,19 +5944,26 @@
         </p:nvSpPr>
         <p:spPr>
           <a:xfrm>
-            <a:off x="581041" y="2180497"/>
-            <a:ext cx="11026743" cy="4144103"/>
+            <a:off x="581041" y="1828800"/>
+            <a:ext cx="11026743" cy="4876799"/>
           </a:xfrm>
         </p:spPr>
         <p:txBody>
           <a:bodyPr>
-            <a:normAutofit/>
+            <a:normAutofit fontScale="92500"/>
           </a:bodyPr>
           <a:lstStyle/>
           <a:p>
+            <a:endParaRPr lang="en-US" sz="2400" dirty="0" smtClean="0"/>
+          </a:p>
+          <a:p>
             <a:r>
               <a:rPr lang="en-US" sz="2400" dirty="0" smtClean="0"/>
-              <a:t>Build a </a:t>
+              <a:t>Build </a:t>
+            </a:r>
+            <a:r>
+              <a:rPr lang="en-US" sz="2400" dirty="0" smtClean="0"/>
+              <a:t>a </a:t>
             </a:r>
             <a:r>
               <a:rPr lang="en-US" sz="2400" dirty="0"/>
@@ -5829,8 +5971,29 @@
             </a:r>
             <a:r>
               <a:rPr lang="en-US" sz="2400" dirty="0" smtClean="0"/>
-              <a:t>to keep in focus capital stocks</a:t>
-            </a:r>
+              <a:t>to </a:t>
+            </a:r>
+            <a:r>
+              <a:rPr lang="en-US" sz="2400" dirty="0" smtClean="0"/>
+              <a:t>create your own list of equity stocks and keep it in focus</a:t>
+            </a:r>
+          </a:p>
+          <a:p>
+            <a:r>
+              <a:rPr lang="en-US" sz="2400" dirty="0" smtClean="0"/>
+              <a:t>Display stock </a:t>
+            </a:r>
+            <a:r>
+              <a:rPr lang="en-US" sz="2400" dirty="0" smtClean="0"/>
+              <a:t>market reports</a:t>
+            </a:r>
+          </a:p>
+          <a:p>
+            <a:r>
+              <a:rPr lang="en-US" sz="2400" dirty="0" smtClean="0"/>
+              <a:t>Build own database for historical prices in order to visualize it in charts </a:t>
+            </a:r>
+            <a:endParaRPr lang="en-US" sz="2400" dirty="0" smtClean="0"/>
           </a:p>
           <a:p>
             <a:r>
@@ -6005,8 +6168,13 @@
           <a:p>
             <a:r>
               <a:rPr lang="en-US" sz="2400" dirty="0" smtClean="0"/>
-              <a:t>Receiving latest real-time data (summary, financial, statistic)</a:t>
-            </a:r>
+              <a:t>Receiving latest real-time data (summary, financial, </a:t>
+            </a:r>
+            <a:r>
+              <a:rPr lang="en-US" sz="2400" dirty="0" smtClean="0"/>
+              <a:t>statistics)</a:t>
+            </a:r>
+            <a:endParaRPr lang="en-US" sz="2400" dirty="0" smtClean="0"/>
           </a:p>
           <a:p>
             <a:r>
@@ -6079,7 +6247,7 @@
       </p:grpSpPr>
       <p:sp>
         <p:nvSpPr>
-          <p:cNvPr id="3" name="Title 2"/>
+          <p:cNvPr id="2" name="Title 1"/>
           <p:cNvSpPr>
             <a:spLocks noGrp="1"/>
           </p:cNvSpPr>
@@ -6093,15 +6261,16 @@
           <a:lstStyle/>
           <a:p>
             <a:r>
-              <a:rPr lang="en-US" dirty="0"/>
-              <a:t>Challenges</a:t>
-            </a:r>
-          </a:p>
-        </p:txBody>
-      </p:sp>
-      <p:sp>
-        <p:nvSpPr>
-          <p:cNvPr id="2" name="Content Placeholder 1"/>
+              <a:rPr lang="en-US" dirty="0" smtClean="0"/>
+              <a:t>Problems and solution</a:t>
+            </a:r>
+            <a:endParaRPr lang="en-US" dirty="0"/>
+          </a:p>
+        </p:txBody>
+      </p:sp>
+      <p:sp>
+        <p:nvSpPr>
+          <p:cNvPr id="3" name="Content Placeholder 2"/>
           <p:cNvSpPr>
             <a:spLocks noGrp="1"/>
           </p:cNvSpPr>
@@ -6112,113 +6281,133 @@
         <p:spPr>
           <a:xfrm>
             <a:off x="581041" y="1828801"/>
-            <a:ext cx="10923571" cy="4030000"/>
+            <a:ext cx="11026743" cy="4800600"/>
           </a:xfrm>
         </p:spPr>
         <p:txBody>
-          <a:bodyPr>
-            <a:normAutofit fontScale="70000" lnSpcReduction="20000"/>
+          <a:bodyPr anchor="t">
+            <a:normAutofit/>
           </a:bodyPr>
           <a:lstStyle/>
           <a:p>
-            <a:endParaRPr lang="en-US" dirty="0" smtClean="0"/>
-          </a:p>
-          <a:p>
-            <a:endParaRPr lang="en-US" dirty="0"/>
-          </a:p>
-          <a:p>
-            <a:endParaRPr lang="en-US" sz="3100" dirty="0" smtClean="0"/>
-          </a:p>
-          <a:p>
-            <a:r>
-              <a:rPr lang="en-US" sz="3100" dirty="0" smtClean="0"/>
-              <a:t>Synchronize different libraries into one application;</a:t>
-            </a:r>
-          </a:p>
-          <a:p>
-            <a:r>
-              <a:rPr lang="en-US" sz="3100" dirty="0"/>
-              <a:t>Need to adopt ORM (python) to MySQL, which allows application to work with many user accounts</a:t>
-            </a:r>
-          </a:p>
-          <a:p>
-            <a:r>
-              <a:rPr lang="en-US" sz="3100" dirty="0" smtClean="0"/>
-              <a:t>Need </a:t>
-            </a:r>
-            <a:r>
-              <a:rPr lang="en-US" sz="3100" dirty="0"/>
-              <a:t>to create an algorithm that </a:t>
-            </a:r>
-            <a:r>
-              <a:rPr lang="en-US" sz="3100" dirty="0" smtClean="0"/>
-              <a:t>will </a:t>
-            </a:r>
-            <a:r>
-              <a:rPr lang="en-US" sz="3100" dirty="0"/>
-              <a:t>combine online data and database for data visualization, minimizing free API data </a:t>
-            </a:r>
-            <a:r>
-              <a:rPr lang="en-US" sz="3100" dirty="0" smtClean="0"/>
-              <a:t>usage:</a:t>
+            <a:pPr>
+              <a:buFont typeface="Wingdings" panose="05000000000000000000" pitchFamily="2" charset="2"/>
+              <a:buChar char="q"/>
+            </a:pPr>
+            <a:r>
+              <a:rPr lang="en-US" sz="2800" dirty="0" smtClean="0"/>
+              <a:t> Problems:</a:t>
+            </a:r>
+          </a:p>
+          <a:p>
+            <a:pPr lvl="1"/>
+            <a:r>
+              <a:rPr lang="en-US" sz="2601" dirty="0" smtClean="0"/>
+              <a:t>Lack </a:t>
+            </a:r>
+            <a:r>
+              <a:rPr lang="en-US" sz="2601" dirty="0"/>
+              <a:t>of </a:t>
+            </a:r>
+            <a:r>
+              <a:rPr lang="en-US" sz="2601" dirty="0" smtClean="0"/>
+              <a:t>open </a:t>
+            </a:r>
+            <a:r>
+              <a:rPr lang="en-US" sz="2601" dirty="0"/>
+              <a:t>API </a:t>
+            </a:r>
+            <a:r>
+              <a:rPr lang="en-US" sz="2601" dirty="0" smtClean="0"/>
+              <a:t>financial data</a:t>
+            </a:r>
+          </a:p>
+          <a:p>
+            <a:pPr lvl="1"/>
+            <a:r>
+              <a:rPr lang="en-US" sz="2601" dirty="0" smtClean="0"/>
+              <a:t>Limits usage of open API data</a:t>
+            </a:r>
+          </a:p>
+          <a:p>
+            <a:pPr>
+              <a:buFont typeface="Wingdings" panose="05000000000000000000" pitchFamily="2" charset="2"/>
+              <a:buChar char="q"/>
+            </a:pPr>
+            <a:r>
+              <a:rPr lang="en-US" sz="2800" dirty="0" smtClean="0"/>
+              <a:t> Solution for minimizing data usage:</a:t>
             </a:r>
           </a:p>
           <a:p>
             <a:pPr lvl="1">
               <a:buFont typeface="Wingdings" panose="05000000000000000000" pitchFamily="2" charset="2"/>
-              <a:buChar char="ü"/>
+              <a:buChar char="§"/>
             </a:pPr>
             <a:r>
-              <a:rPr lang="en-US" sz="3100" dirty="0" smtClean="0"/>
-              <a:t>take data from database and pull rest of needed data online</a:t>
+              <a:rPr lang="en-US" sz="2601" dirty="0" smtClean="0"/>
+              <a:t>Creating own database</a:t>
             </a:r>
           </a:p>
           <a:p>
             <a:pPr lvl="1">
               <a:buFont typeface="Wingdings" panose="05000000000000000000" pitchFamily="2" charset="2"/>
-              <a:buChar char="ü"/>
+              <a:buChar char="§"/>
             </a:pPr>
             <a:r>
-              <a:rPr lang="en-US" sz="3100" dirty="0" smtClean="0"/>
-              <a:t>record data to database without duplicates and missed dates</a:t>
+              <a:rPr lang="en-US" sz="2601" dirty="0" smtClean="0"/>
+              <a:t>Using combined sources of data: </a:t>
+            </a:r>
+            <a:r>
+              <a:rPr lang="en-US" sz="2601" u="sng" dirty="0" smtClean="0"/>
+              <a:t>database</a:t>
+            </a:r>
+            <a:r>
+              <a:rPr lang="en-US" sz="2601" dirty="0" smtClean="0"/>
+              <a:t> and </a:t>
+            </a:r>
+            <a:r>
+              <a:rPr lang="en-US" sz="2601" u="sng" dirty="0" smtClean="0"/>
+              <a:t>online</a:t>
+            </a:r>
+            <a:r>
+              <a:rPr lang="en-US" sz="2601" dirty="0" smtClean="0"/>
+              <a:t> source</a:t>
             </a:r>
           </a:p>
           <a:p>
             <a:pPr lvl="1">
               <a:buFont typeface="Wingdings" panose="05000000000000000000" pitchFamily="2" charset="2"/>
-              <a:buChar char="ü"/>
+              <a:buChar char="§"/>
             </a:pPr>
             <a:r>
-              <a:rPr lang="en-US" sz="3100" dirty="0" smtClean="0"/>
-              <a:t>display data in given date range</a:t>
-            </a:r>
-          </a:p>
-          <a:p>
-            <a:pPr lvl="1"/>
-            <a:endParaRPr lang="en-US" sz="3100" dirty="0"/>
-          </a:p>
-          <a:p>
-            <a:pPr lvl="1"/>
-            <a:endParaRPr lang="en-US" sz="3100" dirty="0"/>
-          </a:p>
-          <a:p>
-            <a:pPr lvl="1"/>
-            <a:endParaRPr lang="en-US" sz="3100" dirty="0"/>
-          </a:p>
-          <a:p>
-            <a:pPr lvl="1"/>
-            <a:endParaRPr lang="en-US" dirty="0"/>
-          </a:p>
-          <a:p>
-            <a:pPr lvl="1"/>
-            <a:endParaRPr lang="en-US" dirty="0"/>
+              <a:rPr lang="en-US" sz="2601" dirty="0" smtClean="0"/>
+              <a:t>Display and cache data at the same time.</a:t>
+            </a:r>
+          </a:p>
+          <a:p>
+            <a:pPr lvl="1">
+              <a:buFont typeface="Wingdings" panose="05000000000000000000" pitchFamily="2" charset="2"/>
+              <a:buChar char="§"/>
+            </a:pPr>
+            <a:endParaRPr lang="en-US" sz="2601" dirty="0" smtClean="0"/>
+          </a:p>
+          <a:p>
+            <a:pPr lvl="1">
+              <a:buFont typeface="Wingdings" panose="05000000000000000000" pitchFamily="2" charset="2"/>
+              <a:buChar char="§"/>
+            </a:pPr>
+            <a:endParaRPr lang="en-US" sz="2601" dirty="0" smtClean="0"/>
+          </a:p>
+          <a:p>
+            <a:endParaRPr lang="en-US" sz="2800" dirty="0"/>
           </a:p>
         </p:txBody>
       </p:sp>
     </p:spTree>
     <p:extLst>
       <p:ext uri="{BB962C8B-B14F-4D97-AF65-F5344CB8AC3E}">
-        <p14:creationId xmlns:p14="http://schemas.microsoft.com/office/powerpoint/2010/main" val="1277194318"/>
+        <p14:creationId xmlns:p14="http://schemas.microsoft.com/office/powerpoint/2010/main" val="210725846"/>
       </p:ext>
     </p:extLst>
   </p:cSld>
@@ -6237,13 +6426,6 @@
       </p:transition>
     </mc:Fallback>
   </mc:AlternateContent>
-  <p:timing>
-    <p:tnLst>
-      <p:par>
-        <p:cTn id="1" dur="indefinite" restart="never" nodeType="tmRoot"/>
-      </p:par>
-    </p:tnLst>
-  </p:timing>
 </p:sld>
 </file>
 
@@ -6266,6 +6448,145 @@
       </p:grpSpPr>
       <p:sp>
         <p:nvSpPr>
+          <p:cNvPr id="2" name="Title 1"/>
+          <p:cNvSpPr>
+            <a:spLocks noGrp="1"/>
+          </p:cNvSpPr>
+          <p:nvPr>
+            <p:ph type="title"/>
+          </p:nvPr>
+        </p:nvSpPr>
+        <p:spPr/>
+        <p:txBody>
+          <a:bodyPr/>
+          <a:lstStyle/>
+          <a:p>
+            <a:r>
+              <a:rPr lang="en-US" dirty="0" smtClean="0"/>
+              <a:t>MySQL cache of API data</a:t>
+            </a:r>
+            <a:endParaRPr lang="en-US" dirty="0"/>
+          </a:p>
+        </p:txBody>
+      </p:sp>
+      <p:sp>
+        <p:nvSpPr>
+          <p:cNvPr id="3" name="Content Placeholder 2"/>
+          <p:cNvSpPr>
+            <a:spLocks noGrp="1"/>
+          </p:cNvSpPr>
+          <p:nvPr>
+            <p:ph idx="1"/>
+          </p:nvPr>
+        </p:nvSpPr>
+        <p:spPr/>
+        <p:txBody>
+          <a:bodyPr anchor="t"/>
+          <a:lstStyle/>
+          <a:p>
+            <a:pPr>
+              <a:buFont typeface="Wingdings" panose="05000000000000000000" pitchFamily="2" charset="2"/>
+              <a:buChar char="q"/>
+            </a:pPr>
+            <a:r>
+              <a:rPr lang="en-US" sz="2400" dirty="0" smtClean="0"/>
+              <a:t>In order to accommodate IEX data limits</a:t>
+            </a:r>
+          </a:p>
+          <a:p>
+            <a:pPr lvl="1"/>
+            <a:r>
+              <a:rPr lang="en-US" sz="2400" dirty="0" smtClean="0"/>
+              <a:t>Created App Database to store a large volume of data</a:t>
+            </a:r>
+          </a:p>
+          <a:p>
+            <a:pPr lvl="1"/>
+            <a:r>
+              <a:rPr lang="en-US" sz="2400" dirty="0" smtClean="0"/>
+              <a:t>Downloaded equity data (financial</a:t>
+            </a:r>
+            <a:r>
+              <a:rPr lang="en-US" sz="2400" dirty="0"/>
+              <a:t>, </a:t>
+            </a:r>
+            <a:r>
+              <a:rPr lang="en-US" sz="2400" dirty="0" smtClean="0"/>
+              <a:t>statistic, historical prices, news) for more than 8500 stocks for last 5 years from IEXtrading.com (Investors Exchange website). Its more than 8 million rows</a:t>
+            </a:r>
+          </a:p>
+          <a:p>
+            <a:pPr lvl="1"/>
+            <a:r>
+              <a:rPr lang="en-US" sz="2400" dirty="0" smtClean="0"/>
+              <a:t>Created intermediate API to seamlessly integrate cached data and API requests</a:t>
+            </a:r>
+          </a:p>
+          <a:p>
+            <a:pPr lvl="1"/>
+            <a:r>
+              <a:rPr lang="en-US" sz="2400" dirty="0" smtClean="0"/>
+              <a:t>Rewrote ORM (Object Relational Mapping) to use MySQL instead of SQLite3</a:t>
+            </a:r>
+          </a:p>
+          <a:p>
+            <a:endParaRPr lang="en-US" sz="2000" dirty="0" smtClean="0"/>
+          </a:p>
+          <a:p>
+            <a:endParaRPr lang="en-US" sz="2000" dirty="0" smtClean="0"/>
+          </a:p>
+          <a:p>
+            <a:endParaRPr lang="en-US" dirty="0" smtClean="0"/>
+          </a:p>
+          <a:p>
+            <a:endParaRPr lang="en-US" dirty="0"/>
+          </a:p>
+        </p:txBody>
+      </p:sp>
+    </p:spTree>
+    <p:extLst>
+      <p:ext uri="{BB962C8B-B14F-4D97-AF65-F5344CB8AC3E}">
+        <p14:creationId xmlns:p14="http://schemas.microsoft.com/office/powerpoint/2010/main" val="817434182"/>
+      </p:ext>
+    </p:extLst>
+  </p:cSld>
+  <p:clrMapOvr>
+    <a:masterClrMapping/>
+  </p:clrMapOvr>
+  <mc:AlternateContent xmlns:mc="http://schemas.openxmlformats.org/markup-compatibility/2006" xmlns:p14="http://schemas.microsoft.com/office/powerpoint/2010/main">
+    <mc:Choice Requires="p14">
+      <p:transition spd="med" p14:dur="700">
+        <p:fade/>
+      </p:transition>
+    </mc:Choice>
+    <mc:Fallback xmlns="">
+      <p:transition spd="med">
+        <p:fade/>
+      </p:transition>
+    </mc:Fallback>
+  </mc:AlternateContent>
+</p:sld>
+</file>
+
+<file path=ppt/slides/slide6.xml><?xml version="1.0" encoding="utf-8"?>
+<p:sld xmlns:a="http://schemas.openxmlformats.org/drawingml/2006/main" xmlns:r="http://schemas.openxmlformats.org/officeDocument/2006/relationships" xmlns:p="http://schemas.openxmlformats.org/presentationml/2006/main">
+  <p:cSld>
+    <p:spTree>
+      <p:nvGrpSpPr>
+        <p:cNvPr id="1" name=""/>
+        <p:cNvGrpSpPr/>
+        <p:nvPr/>
+      </p:nvGrpSpPr>
+      <p:grpSpPr>
+        <a:xfrm>
+          <a:off x="0" y="0"/>
+          <a:ext cx="0" cy="0"/>
+          <a:chOff x="0" y="0"/>
+          <a:chExt cx="0" cy="0"/>
+        </a:xfrm>
+      </p:grpSpPr>
+      <p:sp>
+        <p:nvSpPr>
           <p:cNvPr id="3" name="Title 2"/>
           <p:cNvSpPr>
             <a:spLocks noGrp="1"/>
@@ -6301,8 +6622,8 @@
         </p:nvSpPr>
         <p:spPr>
           <a:xfrm>
-            <a:off x="5017569" y="678154"/>
-            <a:ext cx="1935017" cy="369332"/>
+            <a:off x="4199612" y="669594"/>
+            <a:ext cx="3287631" cy="369332"/>
           </a:xfrm>
           <a:prstGeom prst="rect">
             <a:avLst/>
@@ -6320,7 +6641,23 @@
                   <a:schemeClr val="bg1"/>
                 </a:solidFill>
               </a:rPr>
-              <a:t>Ticker, DateRange</a:t>
+              <a:t>Request </a:t>
+            </a:r>
+            <a:r>
+              <a:rPr lang="en-US" dirty="0">
+                <a:solidFill>
+                  <a:schemeClr val="bg1"/>
+                </a:solidFill>
+              </a:rPr>
+              <a:t>(</a:t>
+            </a:r>
+            <a:r>
+              <a:rPr lang="en-US" dirty="0" smtClean="0">
+                <a:solidFill>
+                  <a:schemeClr val="bg1"/>
+                </a:solidFill>
+              </a:rPr>
+              <a:t>Ticker and Time Range)</a:t>
             </a:r>
             <a:endParaRPr lang="en-US" dirty="0">
               <a:solidFill>
@@ -7097,19 +7434,7 @@
                 <a:latin typeface="Arial" panose="020B0604020202020204" pitchFamily="34" charset="0"/>
                 <a:cs typeface="Arial" panose="020B0604020202020204" pitchFamily="34" charset="0"/>
               </a:rPr>
-              <a:t>[0</a:t>
-            </a:r>
-            <a:r>
-              <a:rPr lang="en-US" dirty="0" smtClean="0">
-                <a:solidFill>
-                  <a:schemeClr val="accent3">
-                    <a:lumMod val="50000"/>
-                  </a:schemeClr>
-                </a:solidFill>
-                <a:latin typeface="Arial" panose="020B0604020202020204" pitchFamily="34" charset="0"/>
-                <a:cs typeface="Arial" panose="020B0604020202020204" pitchFamily="34" charset="0"/>
-              </a:rPr>
-              <a:t>] </a:t>
+              <a:t>[0] </a:t>
             </a:r>
             <a:r>
               <a:rPr lang="en-US" b="1" dirty="0" smtClean="0">
@@ -7575,14 +7900,24 @@
           <a:p>
             <a:pPr algn="ctr"/>
             <a:r>
-              <a:rPr lang="en-US" sz="1600" dirty="0" smtClean="0">
+              <a:rPr lang="en-US" sz="1600" i="1" dirty="0" smtClean="0">
                 <a:solidFill>
                   <a:schemeClr val="tx1"/>
                 </a:solidFill>
                 <a:latin typeface="Arial" panose="020B0604020202020204" pitchFamily="34" charset="0"/>
                 <a:cs typeface="Arial" panose="020B0604020202020204" pitchFamily="34" charset="0"/>
               </a:rPr>
-              <a:t>Slice[</a:t>
+              <a:t>Slice</a:t>
+            </a:r>
+            <a:r>
+              <a:rPr lang="en-US" sz="1600" dirty="0" smtClean="0">
+                <a:solidFill>
+                  <a:schemeClr val="tx1"/>
+                </a:solidFill>
+                <a:latin typeface="Arial" panose="020B0604020202020204" pitchFamily="34" charset="0"/>
+                <a:cs typeface="Arial" panose="020B0604020202020204" pitchFamily="34" charset="0"/>
+              </a:rPr>
+              <a:t>[</a:t>
             </a:r>
             <a:r>
               <a:rPr lang="en-US" b="1" dirty="0" smtClean="0">
@@ -7652,7 +7987,7 @@
         </p:nvSpPr>
         <p:spPr>
           <a:xfrm>
-            <a:off x="379412" y="5876661"/>
+            <a:off x="608012" y="5733051"/>
             <a:ext cx="11429999" cy="529552"/>
           </a:xfrm>
           <a:prstGeom prst="rect">
@@ -7938,7 +8273,7 @@
         <p:spPr>
           <a:xfrm>
             <a:off x="5852157" y="5547016"/>
-            <a:ext cx="266549" cy="288438"/>
+            <a:ext cx="266549" cy="174102"/>
           </a:xfrm>
           <a:prstGeom prst="downArrow">
             <a:avLst/>
@@ -8530,331 +8865,6 @@
     <p:extLst>
       <p:ext uri="{BB962C8B-B14F-4D97-AF65-F5344CB8AC3E}">
         <p14:creationId xmlns:p14="http://schemas.microsoft.com/office/powerpoint/2010/main" val="647842249"/>
-      </p:ext>
-    </p:extLst>
-  </p:cSld>
-  <p:clrMapOvr>
-    <a:masterClrMapping/>
-  </p:clrMapOvr>
-  <mc:AlternateContent xmlns:mc="http://schemas.openxmlformats.org/markup-compatibility/2006" xmlns:p14="http://schemas.microsoft.com/office/powerpoint/2010/main">
-    <mc:Choice Requires="p14">
-      <p:transition spd="med" p14:dur="700">
-        <p:fade/>
-      </p:transition>
-    </mc:Choice>
-    <mc:Fallback xmlns="">
-      <p:transition spd="med">
-        <p:fade/>
-      </p:transition>
-    </mc:Fallback>
-  </mc:AlternateContent>
-  <p:timing>
-    <p:tnLst>
-      <p:par>
-        <p:cTn id="1" dur="indefinite" restart="never" nodeType="tmRoot"/>
-      </p:par>
-    </p:tnLst>
-  </p:timing>
-</p:sld>
-</file>
-
-<file path=ppt/slides/slide6.xml><?xml version="1.0" encoding="utf-8"?>
-<p:sld xmlns:a="http://schemas.openxmlformats.org/drawingml/2006/main" xmlns:r="http://schemas.openxmlformats.org/officeDocument/2006/relationships" xmlns:p="http://schemas.openxmlformats.org/presentationml/2006/main">
-  <p:cSld>
-    <p:spTree>
-      <p:nvGrpSpPr>
-        <p:cNvPr id="1" name=""/>
-        <p:cNvGrpSpPr/>
-        <p:nvPr/>
-      </p:nvGrpSpPr>
-      <p:grpSpPr>
-        <a:xfrm>
-          <a:off x="0" y="0"/>
-          <a:ext cx="0" cy="0"/>
-          <a:chOff x="0" y="0"/>
-          <a:chExt cx="0" cy="0"/>
-        </a:xfrm>
-      </p:grpSpPr>
-      <p:sp>
-        <p:nvSpPr>
-          <p:cNvPr id="3" name="Title 2"/>
-          <p:cNvSpPr>
-            <a:spLocks noGrp="1"/>
-          </p:cNvSpPr>
-          <p:nvPr>
-            <p:ph type="title"/>
-          </p:nvPr>
-        </p:nvSpPr>
-        <p:spPr/>
-        <p:txBody>
-          <a:bodyPr>
-            <a:normAutofit/>
-          </a:bodyPr>
-          <a:lstStyle/>
-          <a:p>
-            <a:r>
-              <a:rPr lang="en-US" dirty="0"/>
-              <a:t>The Tools and Technology to GET IT </a:t>
-            </a:r>
-            <a:r>
-              <a:rPr lang="en-US" dirty="0" smtClean="0"/>
-              <a:t>DONE</a:t>
-            </a:r>
-            <a:endParaRPr lang="en-US" dirty="0"/>
-          </a:p>
-        </p:txBody>
-      </p:sp>
-      <p:sp>
-        <p:nvSpPr>
-          <p:cNvPr id="2" name="Content Placeholder 1"/>
-          <p:cNvSpPr>
-            <a:spLocks noGrp="1"/>
-          </p:cNvSpPr>
-          <p:nvPr>
-            <p:ph sz="half" idx="1"/>
-          </p:nvPr>
-        </p:nvSpPr>
-        <p:spPr>
-          <a:xfrm>
-            <a:off x="1217612" y="2228004"/>
-            <a:ext cx="6096000" cy="4248996"/>
-          </a:xfrm>
-        </p:spPr>
-        <p:txBody>
-          <a:bodyPr anchor="t">
-            <a:noAutofit/>
-          </a:bodyPr>
-          <a:lstStyle/>
-          <a:p>
-            <a:pPr>
-              <a:buFont typeface="Wingdings" panose="05000000000000000000" pitchFamily="2" charset="2"/>
-              <a:buChar char="q"/>
-            </a:pPr>
-            <a:r>
-              <a:rPr lang="en-US" sz="2000" b="1" u="sng" dirty="0" smtClean="0"/>
-              <a:t>User </a:t>
-            </a:r>
-            <a:r>
-              <a:rPr lang="en-US" sz="2000" b="1" u="sng" dirty="0"/>
-              <a:t>Interface</a:t>
-            </a:r>
-          </a:p>
-          <a:p>
-            <a:pPr lvl="1"/>
-            <a:r>
-              <a:rPr lang="en-US" sz="2000" dirty="0"/>
-              <a:t>React JS</a:t>
-            </a:r>
-          </a:p>
-          <a:p>
-            <a:pPr lvl="1"/>
-            <a:r>
-              <a:rPr lang="en-US" sz="2000" dirty="0"/>
-              <a:t>HTML</a:t>
-            </a:r>
-          </a:p>
-          <a:p>
-            <a:pPr lvl="1"/>
-            <a:r>
-              <a:rPr lang="en-US" sz="2000" dirty="0" smtClean="0"/>
-              <a:t>CSS</a:t>
-            </a:r>
-          </a:p>
-          <a:p>
-            <a:pPr>
-              <a:buFont typeface="Wingdings" panose="05000000000000000000" pitchFamily="2" charset="2"/>
-              <a:buChar char="q"/>
-            </a:pPr>
-            <a:r>
-              <a:rPr lang="en-US" sz="2000" b="1" u="sng" dirty="0"/>
-              <a:t>React </a:t>
-            </a:r>
-            <a:r>
-              <a:rPr lang="en-US" sz="2000" b="1" u="sng" dirty="0" smtClean="0"/>
-              <a:t>Libraries and Frameworks</a:t>
-            </a:r>
-            <a:endParaRPr lang="en-US" sz="2000" b="1" u="sng" dirty="0"/>
-          </a:p>
-          <a:p>
-            <a:pPr lvl="1"/>
-            <a:r>
-              <a:rPr lang="en-US" sz="2000" dirty="0"/>
-              <a:t>React, </a:t>
-            </a:r>
-            <a:r>
-              <a:rPr lang="en-US" sz="2000" dirty="0" smtClean="0"/>
-              <a:t>react-router-</a:t>
-            </a:r>
-            <a:r>
-              <a:rPr lang="en-US" sz="2000" dirty="0" err="1" smtClean="0"/>
-              <a:t>dom</a:t>
-            </a:r>
-            <a:r>
-              <a:rPr lang="en-US" sz="2000" dirty="0"/>
-              <a:t>, </a:t>
-            </a:r>
-            <a:r>
-              <a:rPr lang="en-US" sz="2000" dirty="0" err="1"/>
-              <a:t>BrowserRouter</a:t>
-            </a:r>
-            <a:r>
-              <a:rPr lang="en-US" sz="2000" dirty="0"/>
-              <a:t>, Redirect and </a:t>
-            </a:r>
-            <a:r>
-              <a:rPr lang="en-US" sz="2000" dirty="0" smtClean="0"/>
-              <a:t>route, </a:t>
-            </a:r>
-          </a:p>
-          <a:p>
-            <a:pPr lvl="1"/>
-            <a:r>
-              <a:rPr lang="en-US" sz="2000" dirty="0" smtClean="0"/>
-              <a:t>Material-</a:t>
-            </a:r>
-            <a:r>
-              <a:rPr lang="en-US" sz="2000" dirty="0" err="1" smtClean="0"/>
-              <a:t>ui</a:t>
-            </a:r>
-            <a:r>
-              <a:rPr lang="en-US" sz="2000" dirty="0" smtClean="0"/>
-              <a:t>, react-</a:t>
-            </a:r>
-            <a:r>
-              <a:rPr lang="en-US" sz="2000" dirty="0" err="1" smtClean="0"/>
-              <a:t>datepicker</a:t>
-            </a:r>
-            <a:r>
-              <a:rPr lang="en-US" sz="2000" dirty="0" smtClean="0"/>
-              <a:t>, round-to, react-select</a:t>
-            </a:r>
-          </a:p>
-          <a:p>
-            <a:pPr>
-              <a:buFont typeface="Wingdings" panose="05000000000000000000" pitchFamily="2" charset="2"/>
-              <a:buChar char="q"/>
-            </a:pPr>
-            <a:r>
-              <a:rPr lang="en-US" sz="2000" b="1" u="sng" dirty="0" smtClean="0"/>
-              <a:t>Data </a:t>
-            </a:r>
-            <a:r>
-              <a:rPr lang="en-US" sz="2000" b="1" u="sng" dirty="0" err="1" smtClean="0"/>
-              <a:t>Vizualization</a:t>
-            </a:r>
-            <a:endParaRPr lang="en-US" sz="2000" b="1" u="sng" dirty="0" smtClean="0"/>
-          </a:p>
-          <a:p>
-            <a:pPr lvl="1">
-              <a:buFont typeface="Wingdings" panose="05000000000000000000" pitchFamily="2" charset="2"/>
-              <a:buChar char="§"/>
-            </a:pPr>
-            <a:r>
-              <a:rPr lang="en-US" sz="2000" dirty="0" smtClean="0"/>
-              <a:t>React-</a:t>
-            </a:r>
-            <a:r>
-              <a:rPr lang="en-US" sz="2000" dirty="0" err="1" smtClean="0"/>
-              <a:t>apexcharts</a:t>
-            </a:r>
-            <a:endParaRPr lang="en-US" sz="2000" dirty="0" smtClean="0"/>
-          </a:p>
-          <a:p>
-            <a:pPr lvl="1"/>
-            <a:endParaRPr lang="en-US" sz="2000" dirty="0"/>
-          </a:p>
-        </p:txBody>
-      </p:sp>
-      <p:sp>
-        <p:nvSpPr>
-          <p:cNvPr id="5" name="Content Placeholder 4"/>
-          <p:cNvSpPr>
-            <a:spLocks noGrp="1"/>
-          </p:cNvSpPr>
-          <p:nvPr>
-            <p:ph sz="half" idx="2"/>
-          </p:nvPr>
-        </p:nvSpPr>
-        <p:spPr>
-          <a:xfrm>
-            <a:off x="7466012" y="2228005"/>
-            <a:ext cx="4141772" cy="3105995"/>
-          </a:xfrm>
-        </p:spPr>
-        <p:txBody>
-          <a:bodyPr anchor="t">
-            <a:noAutofit/>
-          </a:bodyPr>
-          <a:lstStyle/>
-          <a:p>
-            <a:pPr>
-              <a:buFont typeface="Wingdings" panose="05000000000000000000" pitchFamily="2" charset="2"/>
-              <a:buChar char="q"/>
-            </a:pPr>
-            <a:r>
-              <a:rPr lang="en-US" sz="2000" b="1" u="sng" dirty="0">
-                <a:latin typeface="+mj-lt"/>
-              </a:rPr>
-              <a:t>API and Logic</a:t>
-            </a:r>
-          </a:p>
-          <a:p>
-            <a:pPr lvl="1"/>
-            <a:r>
-              <a:rPr lang="en-US" sz="2000" dirty="0">
-                <a:latin typeface="+mj-lt"/>
-              </a:rPr>
-              <a:t>Python 3.6.7</a:t>
-            </a:r>
-          </a:p>
-          <a:p>
-            <a:pPr lvl="1"/>
-            <a:r>
-              <a:rPr lang="en-US" sz="2000" dirty="0">
-                <a:latin typeface="+mj-lt"/>
-              </a:rPr>
-              <a:t>Flask</a:t>
-            </a:r>
-          </a:p>
-          <a:p>
-            <a:pPr lvl="1"/>
-            <a:r>
-              <a:rPr lang="en-US" sz="2000" dirty="0">
-                <a:latin typeface="+mj-lt"/>
-              </a:rPr>
-              <a:t>PyMySQL</a:t>
-            </a:r>
-          </a:p>
-          <a:p>
-            <a:pPr>
-              <a:buFont typeface="Wingdings" panose="05000000000000000000" pitchFamily="2" charset="2"/>
-              <a:buChar char="q"/>
-            </a:pPr>
-            <a:r>
-              <a:rPr lang="en-US" sz="2000" b="1" u="sng" dirty="0">
-                <a:latin typeface="+mj-lt"/>
-              </a:rPr>
-              <a:t>Database</a:t>
-            </a:r>
-          </a:p>
-          <a:p>
-            <a:pPr lvl="1"/>
-            <a:r>
-              <a:rPr lang="en-US" sz="2000" dirty="0">
-                <a:latin typeface="+mj-lt"/>
-              </a:rPr>
-              <a:t>MySQL</a:t>
-            </a:r>
-          </a:p>
-          <a:p>
-            <a:endParaRPr lang="en-US" sz="2000" dirty="0"/>
-          </a:p>
-        </p:txBody>
-      </p:sp>
-    </p:spTree>
-    <p:extLst>
-      <p:ext uri="{BB962C8B-B14F-4D97-AF65-F5344CB8AC3E}">
-        <p14:creationId xmlns:p14="http://schemas.microsoft.com/office/powerpoint/2010/main" val="3519010733"/>
       </p:ext>
     </p:extLst>
   </p:cSld>
@@ -8902,7 +8912,7 @@
       </p:grpSpPr>
       <p:sp>
         <p:nvSpPr>
-          <p:cNvPr id="7" name="Title 6"/>
+          <p:cNvPr id="3" name="Title 2"/>
           <p:cNvSpPr>
             <a:spLocks noGrp="1"/>
           </p:cNvSpPr>
@@ -8912,21 +8922,274 @@
         </p:nvSpPr>
         <p:spPr/>
         <p:txBody>
-          <a:bodyPr/>
-          <a:lstStyle/>
-          <a:p>
+          <a:bodyPr>
+            <a:normAutofit/>
+          </a:bodyPr>
+          <a:lstStyle/>
+          <a:p>
+            <a:r>
+              <a:rPr lang="en-US" dirty="0"/>
+              <a:t>The Tools and Technology to GET IT </a:t>
+            </a:r>
             <a:r>
               <a:rPr lang="en-US" dirty="0" smtClean="0"/>
-              <a:t>Time to demo</a:t>
+              <a:t>DONE</a:t>
             </a:r>
             <a:endParaRPr lang="en-US" dirty="0"/>
+          </a:p>
+        </p:txBody>
+      </p:sp>
+      <p:sp>
+        <p:nvSpPr>
+          <p:cNvPr id="2" name="Content Placeholder 1"/>
+          <p:cNvSpPr>
+            <a:spLocks noGrp="1"/>
+          </p:cNvSpPr>
+          <p:nvPr>
+            <p:ph sz="half" idx="1"/>
+          </p:nvPr>
+        </p:nvSpPr>
+        <p:spPr>
+          <a:xfrm>
+            <a:off x="1217612" y="2228004"/>
+            <a:ext cx="6096000" cy="4248996"/>
+          </a:xfrm>
+        </p:spPr>
+        <p:txBody>
+          <a:bodyPr anchor="t">
+            <a:noAutofit/>
+          </a:bodyPr>
+          <a:lstStyle/>
+          <a:p>
+            <a:pPr>
+              <a:buFont typeface="Wingdings" panose="05000000000000000000" pitchFamily="2" charset="2"/>
+              <a:buChar char="q"/>
+            </a:pPr>
+            <a:r>
+              <a:rPr lang="en-US" sz="2000" b="1" u="sng" dirty="0" smtClean="0"/>
+              <a:t>User </a:t>
+            </a:r>
+            <a:r>
+              <a:rPr lang="en-US" sz="2000" b="1" u="sng" dirty="0"/>
+              <a:t>Interface</a:t>
+            </a:r>
+          </a:p>
+          <a:p>
+            <a:pPr lvl="1"/>
+            <a:r>
+              <a:rPr lang="en-US" sz="2000" dirty="0"/>
+              <a:t>React JS</a:t>
+            </a:r>
+          </a:p>
+          <a:p>
+            <a:pPr lvl="1"/>
+            <a:r>
+              <a:rPr lang="en-US" sz="2000" dirty="0"/>
+              <a:t>HTML</a:t>
+            </a:r>
+          </a:p>
+          <a:p>
+            <a:pPr lvl="1"/>
+            <a:r>
+              <a:rPr lang="en-US" sz="2000" dirty="0" smtClean="0"/>
+              <a:t>CSS</a:t>
+            </a:r>
+          </a:p>
+          <a:p>
+            <a:pPr>
+              <a:buFont typeface="Wingdings" panose="05000000000000000000" pitchFamily="2" charset="2"/>
+              <a:buChar char="q"/>
+            </a:pPr>
+            <a:r>
+              <a:rPr lang="en-US" sz="2000" b="1" u="sng" dirty="0"/>
+              <a:t>React </a:t>
+            </a:r>
+            <a:r>
+              <a:rPr lang="en-US" sz="2000" b="1" u="sng" dirty="0" smtClean="0"/>
+              <a:t>Libraries and Frameworks</a:t>
+            </a:r>
+            <a:endParaRPr lang="en-US" sz="2000" b="1" u="sng" dirty="0"/>
+          </a:p>
+          <a:p>
+            <a:pPr lvl="1"/>
+            <a:r>
+              <a:rPr lang="en-US" sz="2000" dirty="0"/>
+              <a:t>React, </a:t>
+            </a:r>
+            <a:r>
+              <a:rPr lang="en-US" sz="2000" dirty="0" smtClean="0"/>
+              <a:t>react-router-</a:t>
+            </a:r>
+            <a:r>
+              <a:rPr lang="en-US" sz="2000" dirty="0" err="1" smtClean="0"/>
+              <a:t>dom</a:t>
+            </a:r>
+            <a:r>
+              <a:rPr lang="en-US" sz="2000" dirty="0"/>
+              <a:t>, </a:t>
+            </a:r>
+            <a:r>
+              <a:rPr lang="en-US" sz="2000" dirty="0" err="1"/>
+              <a:t>BrowserRouter</a:t>
+            </a:r>
+            <a:r>
+              <a:rPr lang="en-US" sz="2000" dirty="0"/>
+              <a:t>, Redirect and </a:t>
+            </a:r>
+            <a:r>
+              <a:rPr lang="en-US" sz="2000" dirty="0" smtClean="0"/>
+              <a:t>route, </a:t>
+            </a:r>
+          </a:p>
+          <a:p>
+            <a:pPr lvl="1"/>
+            <a:r>
+              <a:rPr lang="en-US" sz="2000" dirty="0" smtClean="0"/>
+              <a:t>Material-</a:t>
+            </a:r>
+            <a:r>
+              <a:rPr lang="en-US" sz="2000" dirty="0" err="1" smtClean="0"/>
+              <a:t>ui</a:t>
+            </a:r>
+            <a:r>
+              <a:rPr lang="en-US" sz="2000" dirty="0" smtClean="0"/>
+              <a:t>, react-</a:t>
+            </a:r>
+            <a:r>
+              <a:rPr lang="en-US" sz="2000" dirty="0" err="1" smtClean="0"/>
+              <a:t>datepicker</a:t>
+            </a:r>
+            <a:r>
+              <a:rPr lang="en-US" sz="2000" dirty="0" smtClean="0"/>
+              <a:t>, round-to, react-select</a:t>
+            </a:r>
+          </a:p>
+          <a:p>
+            <a:pPr>
+              <a:buFont typeface="Wingdings" panose="05000000000000000000" pitchFamily="2" charset="2"/>
+              <a:buChar char="q"/>
+            </a:pPr>
+            <a:r>
+              <a:rPr lang="en-US" sz="2000" b="1" u="sng" dirty="0" smtClean="0"/>
+              <a:t>Data </a:t>
+            </a:r>
+            <a:r>
+              <a:rPr lang="en-US" sz="2000" b="1" u="sng" dirty="0" err="1" smtClean="0"/>
+              <a:t>Vizualization</a:t>
+            </a:r>
+            <a:endParaRPr lang="en-US" sz="2000" b="1" u="sng" dirty="0" smtClean="0"/>
+          </a:p>
+          <a:p>
+            <a:pPr lvl="1">
+              <a:buFont typeface="Wingdings" panose="05000000000000000000" pitchFamily="2" charset="2"/>
+              <a:buChar char="§"/>
+            </a:pPr>
+            <a:r>
+              <a:rPr lang="en-US" sz="2000" dirty="0" smtClean="0"/>
+              <a:t>React-</a:t>
+            </a:r>
+            <a:r>
+              <a:rPr lang="en-US" sz="2000" dirty="0" err="1" smtClean="0"/>
+              <a:t>apexcharts</a:t>
+            </a:r>
+            <a:endParaRPr lang="en-US" sz="2000" dirty="0" smtClean="0"/>
+          </a:p>
+          <a:p>
+            <a:pPr lvl="1"/>
+            <a:endParaRPr lang="en-US" sz="2000" dirty="0"/>
+          </a:p>
+        </p:txBody>
+      </p:sp>
+      <p:sp>
+        <p:nvSpPr>
+          <p:cNvPr id="5" name="Content Placeholder 4"/>
+          <p:cNvSpPr>
+            <a:spLocks noGrp="1"/>
+          </p:cNvSpPr>
+          <p:nvPr>
+            <p:ph sz="half" idx="2"/>
+          </p:nvPr>
+        </p:nvSpPr>
+        <p:spPr>
+          <a:xfrm>
+            <a:off x="7466012" y="2228005"/>
+            <a:ext cx="4141772" cy="3105995"/>
+          </a:xfrm>
+        </p:spPr>
+        <p:txBody>
+          <a:bodyPr anchor="t">
+            <a:noAutofit/>
+          </a:bodyPr>
+          <a:lstStyle/>
+          <a:p>
+            <a:pPr>
+              <a:buFont typeface="Wingdings" panose="05000000000000000000" pitchFamily="2" charset="2"/>
+              <a:buChar char="q"/>
+            </a:pPr>
+            <a:r>
+              <a:rPr lang="en-US" sz="2000" b="1" u="sng" dirty="0">
+                <a:latin typeface="+mj-lt"/>
+              </a:rPr>
+              <a:t>API and Logic</a:t>
+            </a:r>
+          </a:p>
+          <a:p>
+            <a:pPr lvl="1"/>
+            <a:r>
+              <a:rPr lang="en-US" sz="2000" dirty="0">
+                <a:latin typeface="+mj-lt"/>
+              </a:rPr>
+              <a:t>Python 3.6.7</a:t>
+            </a:r>
+          </a:p>
+          <a:p>
+            <a:pPr lvl="1"/>
+            <a:r>
+              <a:rPr lang="en-US" sz="2000" dirty="0">
+                <a:latin typeface="+mj-lt"/>
+              </a:rPr>
+              <a:t>Flask</a:t>
+            </a:r>
+          </a:p>
+          <a:p>
+            <a:pPr lvl="1"/>
+            <a:r>
+              <a:rPr lang="en-US" sz="2000" dirty="0">
+                <a:latin typeface="+mj-lt"/>
+              </a:rPr>
+              <a:t>PyMySQL</a:t>
+            </a:r>
+          </a:p>
+          <a:p>
+            <a:pPr>
+              <a:buFont typeface="Wingdings" panose="05000000000000000000" pitchFamily="2" charset="2"/>
+              <a:buChar char="q"/>
+            </a:pPr>
+            <a:r>
+              <a:rPr lang="en-US" sz="2000" b="1" u="sng" dirty="0">
+                <a:latin typeface="+mj-lt"/>
+              </a:rPr>
+              <a:t>Database</a:t>
+            </a:r>
+          </a:p>
+          <a:p>
+            <a:pPr lvl="1"/>
+            <a:r>
+              <a:rPr lang="en-US" sz="2000" dirty="0">
+                <a:latin typeface="+mj-lt"/>
+              </a:rPr>
+              <a:t>MySQL</a:t>
+            </a:r>
+          </a:p>
+          <a:p>
+            <a:endParaRPr lang="en-US" sz="2000" dirty="0"/>
           </a:p>
         </p:txBody>
       </p:sp>
     </p:spTree>
     <p:extLst>
       <p:ext uri="{BB962C8B-B14F-4D97-AF65-F5344CB8AC3E}">
-        <p14:creationId xmlns:p14="http://schemas.microsoft.com/office/powerpoint/2010/main" val="3362924388"/>
+        <p14:creationId xmlns:p14="http://schemas.microsoft.com/office/powerpoint/2010/main" val="3519010733"/>
       </p:ext>
     </p:extLst>
   </p:cSld>
@@ -8974,7 +9237,7 @@
       </p:grpSpPr>
       <p:sp>
         <p:nvSpPr>
-          <p:cNvPr id="3" name="Title 2"/>
+          <p:cNvPr id="7" name="Title 6"/>
           <p:cNvSpPr>
             <a:spLocks noGrp="1"/>
           </p:cNvSpPr>
@@ -8988,78 +9251,210 @@
           <a:lstStyle/>
           <a:p>
             <a:r>
-              <a:rPr lang="en-US" dirty="0"/>
-              <a:t>Extended </a:t>
-            </a:r>
-            <a:r>
               <a:rPr lang="en-US" dirty="0" smtClean="0"/>
-              <a:t>Features</a:t>
+              <a:t>Time to demo</a:t>
             </a:r>
             <a:endParaRPr lang="en-US" dirty="0"/>
-          </a:p>
-        </p:txBody>
-      </p:sp>
-      <p:sp>
-        <p:nvSpPr>
-          <p:cNvPr id="2" name="Content Placeholder 1"/>
-          <p:cNvSpPr>
-            <a:spLocks noGrp="1"/>
-          </p:cNvSpPr>
-          <p:nvPr>
-            <p:ph idx="1"/>
-          </p:nvPr>
-        </p:nvSpPr>
-        <p:spPr/>
-        <p:txBody>
-          <a:bodyPr>
-            <a:normAutofit/>
-          </a:bodyPr>
-          <a:lstStyle/>
-          <a:p>
-            <a:pPr>
-              <a:buFont typeface="Wingdings" panose="05000000000000000000" pitchFamily="2" charset="2"/>
-              <a:buChar char="q"/>
-            </a:pPr>
-            <a:r>
-              <a:rPr lang="en-US" sz="2400" dirty="0" smtClean="0"/>
-              <a:t>Screening modules:</a:t>
-            </a:r>
-            <a:endParaRPr lang="en-US" sz="2400" dirty="0"/>
-          </a:p>
-          <a:p>
-            <a:pPr lvl="1"/>
-            <a:r>
-              <a:rPr lang="en-US" sz="2400" dirty="0"/>
-              <a:t>This will allow the user to </a:t>
-            </a:r>
-            <a:r>
-              <a:rPr lang="en-US" sz="2400" dirty="0" smtClean="0"/>
-              <a:t>select stocks by </a:t>
-            </a:r>
-            <a:r>
-              <a:rPr lang="en-US" sz="2400" dirty="0" smtClean="0"/>
-              <a:t>criteria</a:t>
-            </a:r>
-            <a:endParaRPr lang="en-US" sz="2400" dirty="0"/>
-          </a:p>
-          <a:p>
-            <a:pPr marL="320040" lvl="1" indent="0">
-              <a:buNone/>
-            </a:pPr>
-            <a:endParaRPr lang="en-US" sz="2400" dirty="0"/>
-          </a:p>
-          <a:p>
-            <a:pPr marL="0" indent="0">
-              <a:buNone/>
-            </a:pPr>
-            <a:endParaRPr lang="en-US" sz="2400" dirty="0"/>
           </a:p>
         </p:txBody>
       </p:sp>
     </p:spTree>
     <p:extLst>
       <p:ext uri="{BB962C8B-B14F-4D97-AF65-F5344CB8AC3E}">
-        <p14:creationId xmlns:p14="http://schemas.microsoft.com/office/powerpoint/2010/main" val="897847061"/>
+        <p14:creationId xmlns:p14="http://schemas.microsoft.com/office/powerpoint/2010/main" val="3362924388"/>
+      </p:ext>
+    </p:extLst>
+  </p:cSld>
+  <p:clrMapOvr>
+    <a:masterClrMapping/>
+  </p:clrMapOvr>
+  <mc:AlternateContent xmlns:mc="http://schemas.openxmlformats.org/markup-compatibility/2006" xmlns:p14="http://schemas.microsoft.com/office/powerpoint/2010/main">
+    <mc:Choice Requires="p14">
+      <p:transition spd="med" p14:dur="700">
+        <p:fade/>
+      </p:transition>
+    </mc:Choice>
+    <mc:Fallback xmlns="">
+      <p:transition spd="med">
+        <p:fade/>
+      </p:transition>
+    </mc:Fallback>
+  </mc:AlternateContent>
+  <p:timing>
+    <p:tnLst>
+      <p:par>
+        <p:cTn id="1" dur="indefinite" restart="never" nodeType="tmRoot"/>
+      </p:par>
+    </p:tnLst>
+  </p:timing>
+</p:sld>
+</file>
+
+<file path=ppt/slides/slide9.xml><?xml version="1.0" encoding="utf-8"?>
+<p:sld xmlns:a="http://schemas.openxmlformats.org/drawingml/2006/main" xmlns:r="http://schemas.openxmlformats.org/officeDocument/2006/relationships" xmlns:p="http://schemas.openxmlformats.org/presentationml/2006/main">
+  <p:cSld>
+    <p:spTree>
+      <p:nvGrpSpPr>
+        <p:cNvPr id="1" name=""/>
+        <p:cNvGrpSpPr/>
+        <p:nvPr/>
+      </p:nvGrpSpPr>
+      <p:grpSpPr>
+        <a:xfrm>
+          <a:off x="0" y="0"/>
+          <a:ext cx="0" cy="0"/>
+          <a:chOff x="0" y="0"/>
+          <a:chExt cx="0" cy="0"/>
+        </a:xfrm>
+      </p:grpSpPr>
+      <p:sp>
+        <p:nvSpPr>
+          <p:cNvPr id="3" name="Title 2"/>
+          <p:cNvSpPr>
+            <a:spLocks noGrp="1"/>
+          </p:cNvSpPr>
+          <p:nvPr>
+            <p:ph type="title"/>
+          </p:nvPr>
+        </p:nvSpPr>
+        <p:spPr/>
+        <p:txBody>
+          <a:bodyPr/>
+          <a:lstStyle/>
+          <a:p>
+            <a:r>
+              <a:rPr lang="en-US" dirty="0"/>
+              <a:t>Challenges</a:t>
+            </a:r>
+          </a:p>
+        </p:txBody>
+      </p:sp>
+      <p:sp>
+        <p:nvSpPr>
+          <p:cNvPr id="2" name="Content Placeholder 1"/>
+          <p:cNvSpPr>
+            <a:spLocks noGrp="1"/>
+          </p:cNvSpPr>
+          <p:nvPr>
+            <p:ph idx="1"/>
+          </p:nvPr>
+        </p:nvSpPr>
+        <p:spPr>
+          <a:xfrm>
+            <a:off x="581041" y="1828800"/>
+            <a:ext cx="10923571" cy="4648199"/>
+          </a:xfrm>
+        </p:spPr>
+        <p:txBody>
+          <a:bodyPr>
+            <a:normAutofit fontScale="85000" lnSpcReduction="20000"/>
+          </a:bodyPr>
+          <a:lstStyle/>
+          <a:p>
+            <a:endParaRPr lang="en-US" dirty="0" smtClean="0"/>
+          </a:p>
+          <a:p>
+            <a:endParaRPr lang="en-US" dirty="0"/>
+          </a:p>
+          <a:p>
+            <a:endParaRPr lang="en-US" sz="3100" dirty="0" smtClean="0"/>
+          </a:p>
+          <a:p>
+            <a:r>
+              <a:rPr lang="en-US" sz="3100" dirty="0" smtClean="0"/>
+              <a:t>Synchronize different libraries into one application;</a:t>
+            </a:r>
+          </a:p>
+          <a:p>
+            <a:r>
+              <a:rPr lang="en-US" sz="3100" dirty="0"/>
+              <a:t>Need to adopt ORM (python) to MySQL, which allows application to work with many user accounts</a:t>
+            </a:r>
+          </a:p>
+          <a:p>
+            <a:r>
+              <a:rPr lang="en-US" sz="3100" dirty="0" smtClean="0"/>
+              <a:t>Need </a:t>
+            </a:r>
+            <a:r>
+              <a:rPr lang="en-US" sz="3100" dirty="0"/>
+              <a:t>to create an algorithm that </a:t>
+            </a:r>
+            <a:r>
+              <a:rPr lang="en-US" sz="3100" dirty="0" smtClean="0"/>
+              <a:t>will </a:t>
+            </a:r>
+            <a:r>
+              <a:rPr lang="en-US" sz="3100" dirty="0"/>
+              <a:t>combine online data and database for data visualization, minimizing free API data </a:t>
+            </a:r>
+            <a:r>
+              <a:rPr lang="en-US" sz="3100" dirty="0" smtClean="0"/>
+              <a:t>usage:</a:t>
+            </a:r>
+          </a:p>
+          <a:p>
+            <a:pPr lvl="1">
+              <a:buFont typeface="Wingdings" panose="05000000000000000000" pitchFamily="2" charset="2"/>
+              <a:buChar char="ü"/>
+            </a:pPr>
+            <a:r>
+              <a:rPr lang="en-US" sz="3100" dirty="0" smtClean="0"/>
+              <a:t>take data from database and pull rest of needed data online</a:t>
+            </a:r>
+          </a:p>
+          <a:p>
+            <a:pPr lvl="1">
+              <a:buFont typeface="Wingdings" panose="05000000000000000000" pitchFamily="2" charset="2"/>
+              <a:buChar char="ü"/>
+            </a:pPr>
+            <a:r>
+              <a:rPr lang="en-US" sz="3100" dirty="0" smtClean="0"/>
+              <a:t>record data to database without duplicates and missed dates</a:t>
+            </a:r>
+          </a:p>
+          <a:p>
+            <a:pPr lvl="1">
+              <a:buFont typeface="Wingdings" panose="05000000000000000000" pitchFamily="2" charset="2"/>
+              <a:buChar char="ü"/>
+            </a:pPr>
+            <a:r>
+              <a:rPr lang="en-US" sz="3100" dirty="0" smtClean="0"/>
+              <a:t>display data in given date </a:t>
+            </a:r>
+            <a:r>
+              <a:rPr lang="en-US" sz="3100" dirty="0" smtClean="0"/>
+              <a:t>range</a:t>
+            </a:r>
+          </a:p>
+          <a:p>
+            <a:pPr marL="323903" lvl="1" indent="0">
+              <a:buNone/>
+            </a:pPr>
+            <a:endParaRPr lang="en-US" sz="3100" dirty="0"/>
+          </a:p>
+          <a:p>
+            <a:pPr lvl="1"/>
+            <a:endParaRPr lang="en-US" sz="3100" dirty="0"/>
+          </a:p>
+          <a:p>
+            <a:pPr lvl="1"/>
+            <a:endParaRPr lang="en-US" sz="3100" dirty="0"/>
+          </a:p>
+          <a:p>
+            <a:pPr lvl="1"/>
+            <a:endParaRPr lang="en-US" dirty="0"/>
+          </a:p>
+          <a:p>
+            <a:pPr lvl="1"/>
+            <a:endParaRPr lang="en-US" dirty="0"/>
+          </a:p>
+        </p:txBody>
+      </p:sp>
+    </p:spTree>
+    <p:extLst>
+      <p:ext uri="{BB962C8B-B14F-4D97-AF65-F5344CB8AC3E}">
+        <p14:creationId xmlns:p14="http://schemas.microsoft.com/office/powerpoint/2010/main" val="1277194318"/>
       </p:ext>
     </p:extLst>
   </p:cSld>

</xml_diff>